<commit_message>
Keep Going, Stop Dreaming
</commit_message>
<xml_diff>
--- a/tmp_PPT.pptx
+++ b/tmp_PPT.pptx
@@ -135,6 +135,18 @@
 </p:presentation>
 </file>
 
+<file path=ppt/commentAuthors.xml><?xml version="1.0" encoding="utf-8"?>
+<p:cmAuthorLst xmlns:a="http://schemas.openxmlformats.org/drawingml/2006/main" xmlns:r="http://schemas.openxmlformats.org/officeDocument/2006/relationships" xmlns:p="http://schemas.openxmlformats.org/presentationml/2006/main">
+  <p:cmAuthor id="1" name="廖海满" initials="廖海满" lastIdx="1" clrIdx="0">
+    <p:extLst>
+      <p:ext uri="{19B8F6BF-5375-455C-9EA6-DF929625EA0E}">
+        <p15:presenceInfo xmlns:p15="http://schemas.microsoft.com/office/powerpoint/2012/main" userId="廖海满" providerId="None"/>
+      </p:ext>
+    </p:extLst>
+  </p:cmAuthor>
+</p:cmAuthorLst>
+</file>
+
 <file path=ppt/notesMasters/notesMaster1.xml><?xml version="1.0" encoding="utf-8"?>
 <p:notesMaster xmlns:a="http://schemas.openxmlformats.org/drawingml/2006/main" xmlns:r="http://schemas.openxmlformats.org/officeDocument/2006/relationships" xmlns:p="http://schemas.openxmlformats.org/presentationml/2006/main">
   <p:cSld>
@@ -217,7 +229,7 @@
           <a:p>
             <a:fld id="{58603D06-1167-455A-BD60-31C1D53F7897}" type="datetimeFigureOut">
               <a:rPr lang="zh-CN" altLang="en-US" smtClean="0"/>
-              <a:t>2021/11/18</a:t>
+              <a:t>2021/11/19</a:t>
             </a:fld>
             <a:endParaRPr lang="zh-CN" altLang="en-US"/>
           </a:p>
@@ -700,7 +712,7 @@
           <a:p>
             <a:fld id="{D98389CA-85B3-42E7-944C-9CD846B27FE3}" type="datetimeFigureOut">
               <a:rPr lang="zh-CN" altLang="en-US" smtClean="0"/>
-              <a:t>2021/11/18</a:t>
+              <a:t>2021/11/19</a:t>
             </a:fld>
             <a:endParaRPr lang="zh-CN" altLang="en-US"/>
           </a:p>
@@ -870,7 +882,7 @@
           <a:p>
             <a:fld id="{D98389CA-85B3-42E7-944C-9CD846B27FE3}" type="datetimeFigureOut">
               <a:rPr lang="zh-CN" altLang="en-US" smtClean="0"/>
-              <a:t>2021/11/18</a:t>
+              <a:t>2021/11/19</a:t>
             </a:fld>
             <a:endParaRPr lang="zh-CN" altLang="en-US"/>
           </a:p>
@@ -1050,7 +1062,7 @@
           <a:p>
             <a:fld id="{D98389CA-85B3-42E7-944C-9CD846B27FE3}" type="datetimeFigureOut">
               <a:rPr lang="zh-CN" altLang="en-US" smtClean="0"/>
-              <a:t>2021/11/18</a:t>
+              <a:t>2021/11/19</a:t>
             </a:fld>
             <a:endParaRPr lang="zh-CN" altLang="en-US"/>
           </a:p>
@@ -1220,7 +1232,7 @@
           <a:p>
             <a:fld id="{D98389CA-85B3-42E7-944C-9CD846B27FE3}" type="datetimeFigureOut">
               <a:rPr lang="zh-CN" altLang="en-US" smtClean="0"/>
-              <a:t>2021/11/18</a:t>
+              <a:t>2021/11/19</a:t>
             </a:fld>
             <a:endParaRPr lang="zh-CN" altLang="en-US"/>
           </a:p>
@@ -1466,7 +1478,7 @@
           <a:p>
             <a:fld id="{D98389CA-85B3-42E7-944C-9CD846B27FE3}" type="datetimeFigureOut">
               <a:rPr lang="zh-CN" altLang="en-US" smtClean="0"/>
-              <a:t>2021/11/18</a:t>
+              <a:t>2021/11/19</a:t>
             </a:fld>
             <a:endParaRPr lang="zh-CN" altLang="en-US"/>
           </a:p>
@@ -1698,7 +1710,7 @@
           <a:p>
             <a:fld id="{D98389CA-85B3-42E7-944C-9CD846B27FE3}" type="datetimeFigureOut">
               <a:rPr lang="zh-CN" altLang="en-US" smtClean="0"/>
-              <a:t>2021/11/18</a:t>
+              <a:t>2021/11/19</a:t>
             </a:fld>
             <a:endParaRPr lang="zh-CN" altLang="en-US"/>
           </a:p>
@@ -2065,7 +2077,7 @@
           <a:p>
             <a:fld id="{D98389CA-85B3-42E7-944C-9CD846B27FE3}" type="datetimeFigureOut">
               <a:rPr lang="zh-CN" altLang="en-US" smtClean="0"/>
-              <a:t>2021/11/18</a:t>
+              <a:t>2021/11/19</a:t>
             </a:fld>
             <a:endParaRPr lang="zh-CN" altLang="en-US"/>
           </a:p>
@@ -2183,7 +2195,7 @@
           <a:p>
             <a:fld id="{D98389CA-85B3-42E7-944C-9CD846B27FE3}" type="datetimeFigureOut">
               <a:rPr lang="zh-CN" altLang="en-US" smtClean="0"/>
-              <a:t>2021/11/18</a:t>
+              <a:t>2021/11/19</a:t>
             </a:fld>
             <a:endParaRPr lang="zh-CN" altLang="en-US"/>
           </a:p>
@@ -2278,7 +2290,7 @@
           <a:p>
             <a:fld id="{D98389CA-85B3-42E7-944C-9CD846B27FE3}" type="datetimeFigureOut">
               <a:rPr lang="zh-CN" altLang="en-US" smtClean="0"/>
-              <a:t>2021/11/18</a:t>
+              <a:t>2021/11/19</a:t>
             </a:fld>
             <a:endParaRPr lang="zh-CN" altLang="en-US"/>
           </a:p>
@@ -2555,7 +2567,7 @@
           <a:p>
             <a:fld id="{D98389CA-85B3-42E7-944C-9CD846B27FE3}" type="datetimeFigureOut">
               <a:rPr lang="zh-CN" altLang="en-US" smtClean="0"/>
-              <a:t>2021/11/18</a:t>
+              <a:t>2021/11/19</a:t>
             </a:fld>
             <a:endParaRPr lang="zh-CN" altLang="en-US"/>
           </a:p>
@@ -2808,7 +2820,7 @@
           <a:p>
             <a:fld id="{D98389CA-85B3-42E7-944C-9CD846B27FE3}" type="datetimeFigureOut">
               <a:rPr lang="zh-CN" altLang="en-US" smtClean="0"/>
-              <a:t>2021/11/18</a:t>
+              <a:t>2021/11/19</a:t>
             </a:fld>
             <a:endParaRPr lang="zh-CN" altLang="en-US"/>
           </a:p>
@@ -3021,7 +3033,7 @@
           <a:p>
             <a:fld id="{D98389CA-85B3-42E7-944C-9CD846B27FE3}" type="datetimeFigureOut">
               <a:rPr lang="zh-CN" altLang="en-US" smtClean="0"/>
-              <a:t>2021/11/18</a:t>
+              <a:t>2021/11/19</a:t>
             </a:fld>
             <a:endParaRPr lang="zh-CN" altLang="en-US"/>
           </a:p>
@@ -13876,14 +13888,7 @@
                 <a:latin typeface="华文楷体" panose="02010600040101010101" pitchFamily="2" charset="-122"/>
                 <a:ea typeface="华文楷体" panose="02010600040101010101" pitchFamily="2" charset="-122"/>
               </a:rPr>
-              <a:t>注：对称系数</a:t>
-            </a:r>
-            <a:r>
-              <a:rPr lang="zh-CN" altLang="en-US" sz="1600" smtClean="0">
-                <a:latin typeface="华文楷体" panose="02010600040101010101" pitchFamily="2" charset="-122"/>
-                <a:ea typeface="华文楷体" panose="02010600040101010101" pitchFamily="2" charset="-122"/>
-              </a:rPr>
-              <a:t>是</a:t>
+              <a:t>注：对称系数是</a:t>
             </a:r>
             <a:r>
               <a:rPr lang="en-US" altLang="zh-CN" sz="1600" smtClean="0">
@@ -14721,7 +14726,7 @@
         <p:spPr>
           <a:xfrm>
             <a:off x="6677329" y="3353904"/>
-            <a:ext cx="854765" cy="695739"/>
+            <a:ext cx="854765" cy="949954"/>
           </a:xfrm>
           <a:prstGeom prst="rect">
             <a:avLst/>
@@ -14761,7 +14766,7 @@
         <p:spPr>
           <a:xfrm>
             <a:off x="8121816" y="3353904"/>
-            <a:ext cx="854765" cy="695739"/>
+            <a:ext cx="854765" cy="949954"/>
           </a:xfrm>
           <a:prstGeom prst="rect">
             <a:avLst/>
@@ -14801,7 +14806,7 @@
         <p:spPr>
           <a:xfrm>
             <a:off x="10401190" y="3353903"/>
-            <a:ext cx="854765" cy="695739"/>
+            <a:ext cx="854765" cy="949955"/>
           </a:xfrm>
           <a:prstGeom prst="rect">
             <a:avLst/>
@@ -14840,7 +14845,7 @@
         </p:nvSpPr>
         <p:spPr>
           <a:xfrm>
-            <a:off x="9276412" y="3440162"/>
+            <a:off x="9274733" y="3567270"/>
             <a:ext cx="824947" cy="523220"/>
           </a:xfrm>
           <a:prstGeom prst="rect">
@@ -15335,6 +15340,9 @@
             <a:avLst/>
           </a:prstGeom>
           <a:noFill/>
+          <a:ln>
+            <a:noFill/>
+          </a:ln>
         </p:spPr>
         <p:txBody>
           <a:bodyPr wrap="square" rtlCol="0">
@@ -15372,13 +15380,16 @@
         </p:nvSpPr>
         <p:spPr>
           <a:xfrm>
-            <a:off x="4601365" y="4343026"/>
+            <a:off x="4603305" y="4332127"/>
             <a:ext cx="487920" cy="307777"/>
           </a:xfrm>
           <a:prstGeom prst="rect">
             <a:avLst/>
           </a:prstGeom>
           <a:noFill/>
+          <a:ln>
+            <a:noFill/>
+          </a:ln>
         </p:spPr>
         <p:txBody>
           <a:bodyPr wrap="square" rtlCol="0">
@@ -15423,6 +15434,9 @@
             <a:avLst/>
           </a:prstGeom>
           <a:noFill/>
+          <a:ln>
+            <a:noFill/>
+          </a:ln>
         </p:spPr>
         <p:txBody>
           <a:bodyPr wrap="square" rtlCol="0">
@@ -15460,13 +15474,16 @@
         </p:nvSpPr>
         <p:spPr>
           <a:xfrm>
-            <a:off x="3662627" y="4343025"/>
+            <a:off x="3636000" y="4328653"/>
             <a:ext cx="487920" cy="307777"/>
           </a:xfrm>
           <a:prstGeom prst="rect">
             <a:avLst/>
           </a:prstGeom>
           <a:noFill/>
+          <a:ln>
+            <a:noFill/>
+          </a:ln>
         </p:spPr>
         <p:txBody>
           <a:bodyPr wrap="square" rtlCol="0">
@@ -15504,7 +15521,7 @@
         </p:nvSpPr>
         <p:spPr>
           <a:xfrm>
-            <a:off x="2391213" y="4343024"/>
+            <a:off x="2391214" y="4336312"/>
             <a:ext cx="619835" cy="307777"/>
           </a:xfrm>
           <a:prstGeom prst="rect">
@@ -15988,7 +16005,7 @@
         </p:nvSpPr>
         <p:spPr>
           <a:xfrm>
-            <a:off x="4214016" y="896446"/>
+            <a:off x="2748395" y="559552"/>
             <a:ext cx="7752079" cy="369332"/>
           </a:xfrm>
           <a:prstGeom prst="rect">
@@ -16053,6 +16070,458 @@
               <a:t>把枪）</a:t>
             </a:r>
             <a:endParaRPr lang="zh-CN" altLang="en-US">
+              <a:latin typeface="华文楷体" panose="02010600040101010101" pitchFamily="2" charset="-122"/>
+              <a:ea typeface="华文楷体" panose="02010600040101010101" pitchFamily="2" charset="-122"/>
+            </a:endParaRPr>
+          </a:p>
+        </p:txBody>
+      </p:sp>
+      <p:cxnSp>
+        <p:nvCxnSpPr>
+          <p:cNvPr id="8" name="肘形连接符 7"/>
+          <p:cNvCxnSpPr/>
+          <p:nvPr/>
+        </p:nvCxnSpPr>
+        <p:spPr>
+          <a:xfrm rot="16200000" flipV="1">
+            <a:off x="6778099" y="3606792"/>
+            <a:ext cx="457887" cy="243273"/>
+          </a:xfrm>
+          <a:prstGeom prst="bentConnector3">
+            <a:avLst>
+              <a:gd name="adj1" fmla="val 50000"/>
+            </a:avLst>
+          </a:prstGeom>
+          <a:ln w="19050">
+            <a:solidFill>
+              <a:schemeClr val="tx1"/>
+            </a:solidFill>
+          </a:ln>
+        </p:spPr>
+        <p:style>
+          <a:lnRef idx="1">
+            <a:schemeClr val="accent1"/>
+          </a:lnRef>
+          <a:fillRef idx="0">
+            <a:schemeClr val="accent1"/>
+          </a:fillRef>
+          <a:effectRef idx="0">
+            <a:schemeClr val="accent1"/>
+          </a:effectRef>
+          <a:fontRef idx="minor">
+            <a:schemeClr val="tx1"/>
+          </a:fontRef>
+        </p:style>
+      </p:cxnSp>
+      <p:cxnSp>
+        <p:nvCxnSpPr>
+          <p:cNvPr id="48" name="肘形连接符 47"/>
+          <p:cNvCxnSpPr/>
+          <p:nvPr/>
+        </p:nvCxnSpPr>
+        <p:spPr>
+          <a:xfrm rot="5400000">
+            <a:off x="7015435" y="3603833"/>
+            <a:ext cx="474935" cy="242061"/>
+          </a:xfrm>
+          <a:prstGeom prst="bentConnector3">
+            <a:avLst>
+              <a:gd name="adj1" fmla="val 50000"/>
+            </a:avLst>
+          </a:prstGeom>
+          <a:ln w="19050">
+            <a:solidFill>
+              <a:schemeClr val="tx1"/>
+            </a:solidFill>
+          </a:ln>
+        </p:spPr>
+        <p:style>
+          <a:lnRef idx="1">
+            <a:schemeClr val="accent1"/>
+          </a:lnRef>
+          <a:fillRef idx="0">
+            <a:schemeClr val="accent1"/>
+          </a:fillRef>
+          <a:effectRef idx="0">
+            <a:schemeClr val="accent1"/>
+          </a:effectRef>
+          <a:fontRef idx="minor">
+            <a:schemeClr val="tx1"/>
+          </a:fontRef>
+        </p:style>
+      </p:cxnSp>
+      <p:sp>
+        <p:nvSpPr>
+          <p:cNvPr id="53" name="文本框 52"/>
+          <p:cNvSpPr txBox="1"/>
+          <p:nvPr/>
+        </p:nvSpPr>
+        <p:spPr>
+          <a:xfrm>
+            <a:off x="6896491" y="3957372"/>
+            <a:ext cx="464168" cy="230832"/>
+          </a:xfrm>
+          <a:prstGeom prst="rect">
+            <a:avLst/>
+          </a:prstGeom>
+          <a:solidFill>
+            <a:schemeClr val="accent2"/>
+          </a:solidFill>
+        </p:spPr>
+        <p:txBody>
+          <a:bodyPr wrap="square" rtlCol="0">
+            <a:spAutoFit/>
+          </a:bodyPr>
+          <a:lstStyle/>
+          <a:p>
+            <a:pPr algn="ctr"/>
+            <a:r>
+              <a:rPr lang="en-US" altLang="zh-CN" sz="900" smtClean="0">
+                <a:latin typeface="华文楷体" panose="02010600040101010101" pitchFamily="2" charset="-122"/>
+                <a:ea typeface="华文楷体" panose="02010600040101010101" pitchFamily="2" charset="-122"/>
+              </a:rPr>
+              <a:t>SECC</a:t>
+            </a:r>
+            <a:endParaRPr lang="zh-CN" altLang="en-US" sz="900">
+              <a:latin typeface="华文楷体" panose="02010600040101010101" pitchFamily="2" charset="-122"/>
+              <a:ea typeface="华文楷体" panose="02010600040101010101" pitchFamily="2" charset="-122"/>
+            </a:endParaRPr>
+          </a:p>
+        </p:txBody>
+      </p:sp>
+      <p:cxnSp>
+        <p:nvCxnSpPr>
+          <p:cNvPr id="60" name="肘形连接符 59"/>
+          <p:cNvCxnSpPr/>
+          <p:nvPr/>
+        </p:nvCxnSpPr>
+        <p:spPr>
+          <a:xfrm rot="16200000" flipV="1">
+            <a:off x="8232527" y="3614954"/>
+            <a:ext cx="457887" cy="243273"/>
+          </a:xfrm>
+          <a:prstGeom prst="bentConnector3">
+            <a:avLst>
+              <a:gd name="adj1" fmla="val 50000"/>
+            </a:avLst>
+          </a:prstGeom>
+          <a:ln w="19050">
+            <a:solidFill>
+              <a:schemeClr val="tx1"/>
+            </a:solidFill>
+          </a:ln>
+        </p:spPr>
+        <p:style>
+          <a:lnRef idx="1">
+            <a:schemeClr val="accent1"/>
+          </a:lnRef>
+          <a:fillRef idx="0">
+            <a:schemeClr val="accent1"/>
+          </a:fillRef>
+          <a:effectRef idx="0">
+            <a:schemeClr val="accent1"/>
+          </a:effectRef>
+          <a:fontRef idx="minor">
+            <a:schemeClr val="tx1"/>
+          </a:fontRef>
+        </p:style>
+      </p:cxnSp>
+      <p:cxnSp>
+        <p:nvCxnSpPr>
+          <p:cNvPr id="61" name="肘形连接符 60"/>
+          <p:cNvCxnSpPr/>
+          <p:nvPr/>
+        </p:nvCxnSpPr>
+        <p:spPr>
+          <a:xfrm rot="5400000">
+            <a:off x="8469863" y="3611995"/>
+            <a:ext cx="474935" cy="242061"/>
+          </a:xfrm>
+          <a:prstGeom prst="bentConnector3">
+            <a:avLst>
+              <a:gd name="adj1" fmla="val 50000"/>
+            </a:avLst>
+          </a:prstGeom>
+          <a:ln w="19050">
+            <a:solidFill>
+              <a:schemeClr val="tx1"/>
+            </a:solidFill>
+          </a:ln>
+        </p:spPr>
+        <p:style>
+          <a:lnRef idx="1">
+            <a:schemeClr val="accent1"/>
+          </a:lnRef>
+          <a:fillRef idx="0">
+            <a:schemeClr val="accent1"/>
+          </a:fillRef>
+          <a:effectRef idx="0">
+            <a:schemeClr val="accent1"/>
+          </a:effectRef>
+          <a:fontRef idx="minor">
+            <a:schemeClr val="tx1"/>
+          </a:fontRef>
+        </p:style>
+      </p:cxnSp>
+      <p:sp>
+        <p:nvSpPr>
+          <p:cNvPr id="62" name="文本框 61"/>
+          <p:cNvSpPr txBox="1"/>
+          <p:nvPr/>
+        </p:nvSpPr>
+        <p:spPr>
+          <a:xfrm>
+            <a:off x="8350919" y="3965534"/>
+            <a:ext cx="464168" cy="230832"/>
+          </a:xfrm>
+          <a:prstGeom prst="rect">
+            <a:avLst/>
+          </a:prstGeom>
+          <a:solidFill>
+            <a:schemeClr val="accent2"/>
+          </a:solidFill>
+        </p:spPr>
+        <p:txBody>
+          <a:bodyPr wrap="square" rtlCol="0">
+            <a:spAutoFit/>
+          </a:bodyPr>
+          <a:lstStyle/>
+          <a:p>
+            <a:pPr algn="ctr"/>
+            <a:r>
+              <a:rPr lang="en-US" altLang="zh-CN" sz="900" smtClean="0">
+                <a:latin typeface="华文楷体" panose="02010600040101010101" pitchFamily="2" charset="-122"/>
+                <a:ea typeface="华文楷体" panose="02010600040101010101" pitchFamily="2" charset="-122"/>
+              </a:rPr>
+              <a:t>SECC</a:t>
+            </a:r>
+            <a:endParaRPr lang="zh-CN" altLang="en-US" sz="900">
+              <a:latin typeface="华文楷体" panose="02010600040101010101" pitchFamily="2" charset="-122"/>
+              <a:ea typeface="华文楷体" panose="02010600040101010101" pitchFamily="2" charset="-122"/>
+            </a:endParaRPr>
+          </a:p>
+        </p:txBody>
+      </p:sp>
+      <p:cxnSp>
+        <p:nvCxnSpPr>
+          <p:cNvPr id="63" name="肘形连接符 62"/>
+          <p:cNvCxnSpPr/>
+          <p:nvPr/>
+        </p:nvCxnSpPr>
+        <p:spPr>
+          <a:xfrm rot="16200000" flipV="1">
+            <a:off x="10511276" y="3619558"/>
+            <a:ext cx="457887" cy="243273"/>
+          </a:xfrm>
+          <a:prstGeom prst="bentConnector3">
+            <a:avLst>
+              <a:gd name="adj1" fmla="val 50000"/>
+            </a:avLst>
+          </a:prstGeom>
+          <a:ln w="19050">
+            <a:solidFill>
+              <a:schemeClr val="tx1"/>
+            </a:solidFill>
+          </a:ln>
+        </p:spPr>
+        <p:style>
+          <a:lnRef idx="1">
+            <a:schemeClr val="accent1"/>
+          </a:lnRef>
+          <a:fillRef idx="0">
+            <a:schemeClr val="accent1"/>
+          </a:fillRef>
+          <a:effectRef idx="0">
+            <a:schemeClr val="accent1"/>
+          </a:effectRef>
+          <a:fontRef idx="minor">
+            <a:schemeClr val="tx1"/>
+          </a:fontRef>
+        </p:style>
+      </p:cxnSp>
+      <p:cxnSp>
+        <p:nvCxnSpPr>
+          <p:cNvPr id="64" name="肘形连接符 63"/>
+          <p:cNvCxnSpPr/>
+          <p:nvPr/>
+        </p:nvCxnSpPr>
+        <p:spPr>
+          <a:xfrm rot="5400000">
+            <a:off x="10748612" y="3616599"/>
+            <a:ext cx="474935" cy="242061"/>
+          </a:xfrm>
+          <a:prstGeom prst="bentConnector3">
+            <a:avLst>
+              <a:gd name="adj1" fmla="val 50000"/>
+            </a:avLst>
+          </a:prstGeom>
+          <a:ln w="19050">
+            <a:solidFill>
+              <a:schemeClr val="tx1"/>
+            </a:solidFill>
+          </a:ln>
+        </p:spPr>
+        <p:style>
+          <a:lnRef idx="1">
+            <a:schemeClr val="accent1"/>
+          </a:lnRef>
+          <a:fillRef idx="0">
+            <a:schemeClr val="accent1"/>
+          </a:fillRef>
+          <a:effectRef idx="0">
+            <a:schemeClr val="accent1"/>
+          </a:effectRef>
+          <a:fontRef idx="minor">
+            <a:schemeClr val="tx1"/>
+          </a:fontRef>
+        </p:style>
+      </p:cxnSp>
+      <p:sp>
+        <p:nvSpPr>
+          <p:cNvPr id="65" name="文本框 64"/>
+          <p:cNvSpPr txBox="1"/>
+          <p:nvPr/>
+        </p:nvSpPr>
+        <p:spPr>
+          <a:xfrm>
+            <a:off x="10629668" y="3970138"/>
+            <a:ext cx="464168" cy="230832"/>
+          </a:xfrm>
+          <a:prstGeom prst="rect">
+            <a:avLst/>
+          </a:prstGeom>
+          <a:solidFill>
+            <a:schemeClr val="accent2"/>
+          </a:solidFill>
+        </p:spPr>
+        <p:txBody>
+          <a:bodyPr wrap="square" rtlCol="0">
+            <a:spAutoFit/>
+          </a:bodyPr>
+          <a:lstStyle/>
+          <a:p>
+            <a:pPr algn="ctr"/>
+            <a:r>
+              <a:rPr lang="en-US" altLang="zh-CN" sz="900" smtClean="0">
+                <a:latin typeface="华文楷体" panose="02010600040101010101" pitchFamily="2" charset="-122"/>
+                <a:ea typeface="华文楷体" panose="02010600040101010101" pitchFamily="2" charset="-122"/>
+              </a:rPr>
+              <a:t>SECC</a:t>
+            </a:r>
+            <a:endParaRPr lang="zh-CN" altLang="en-US" sz="900">
+              <a:latin typeface="华文楷体" panose="02010600040101010101" pitchFamily="2" charset="-122"/>
+              <a:ea typeface="华文楷体" panose="02010600040101010101" pitchFamily="2" charset="-122"/>
+            </a:endParaRPr>
+          </a:p>
+        </p:txBody>
+      </p:sp>
+      <p:sp>
+        <p:nvSpPr>
+          <p:cNvPr id="66" name="线形标注 2 65"/>
+          <p:cNvSpPr/>
+          <p:nvPr/>
+        </p:nvSpPr>
+        <p:spPr>
+          <a:xfrm>
+            <a:off x="7990218" y="1480278"/>
+            <a:ext cx="2626510" cy="573304"/>
+          </a:xfrm>
+          <a:prstGeom prst="borderCallout2">
+            <a:avLst>
+              <a:gd name="adj1" fmla="val 18750"/>
+              <a:gd name="adj2" fmla="val -8333"/>
+              <a:gd name="adj3" fmla="val 18750"/>
+              <a:gd name="adj4" fmla="val -16667"/>
+              <a:gd name="adj5" fmla="val 328556"/>
+              <a:gd name="adj6" fmla="val -34662"/>
+            </a:avLst>
+          </a:prstGeom>
+          <a:noFill/>
+        </p:spPr>
+        <p:style>
+          <a:lnRef idx="2">
+            <a:schemeClr val="accent1">
+              <a:shade val="50000"/>
+            </a:schemeClr>
+          </a:lnRef>
+          <a:fillRef idx="1">
+            <a:schemeClr val="accent1"/>
+          </a:fillRef>
+          <a:effectRef idx="0">
+            <a:schemeClr val="accent1"/>
+          </a:effectRef>
+          <a:fontRef idx="minor">
+            <a:schemeClr val="lt1"/>
+          </a:fontRef>
+        </p:style>
+        <p:txBody>
+          <a:bodyPr rtlCol="0" anchor="ctr"/>
+          <a:lstStyle/>
+          <a:p>
+            <a:pPr algn="ctr"/>
+            <a:endParaRPr lang="zh-CN" altLang="en-US"/>
+          </a:p>
+        </p:txBody>
+      </p:sp>
+      <p:sp>
+        <p:nvSpPr>
+          <p:cNvPr id="67" name="文本框 66"/>
+          <p:cNvSpPr txBox="1"/>
+          <p:nvPr/>
+        </p:nvSpPr>
+        <p:spPr>
+          <a:xfrm>
+            <a:off x="8090055" y="1502441"/>
+            <a:ext cx="2402222" cy="523220"/>
+          </a:xfrm>
+          <a:prstGeom prst="rect">
+            <a:avLst/>
+          </a:prstGeom>
+          <a:noFill/>
+        </p:spPr>
+        <p:txBody>
+          <a:bodyPr wrap="square" rtlCol="0">
+            <a:spAutoFit/>
+          </a:bodyPr>
+          <a:lstStyle/>
+          <a:p>
+            <a:pPr algn="ctr"/>
+            <a:r>
+              <a:rPr lang="zh-CN" altLang="en-US" sz="1400" smtClean="0">
+                <a:latin typeface="华文楷体" panose="02010600040101010101" pitchFamily="2" charset="-122"/>
+                <a:ea typeface="华文楷体" panose="02010600040101010101" pitchFamily="2" charset="-122"/>
+              </a:rPr>
+              <a:t>桩端控制枪通断的两个继电器</a:t>
+            </a:r>
+            <a:r>
+              <a:rPr lang="en-US" altLang="zh-CN" sz="1400" smtClean="0">
+                <a:latin typeface="华文楷体" panose="02010600040101010101" pitchFamily="2" charset="-122"/>
+                <a:ea typeface="华文楷体" panose="02010600040101010101" pitchFamily="2" charset="-122"/>
+              </a:rPr>
+              <a:t>DC+</a:t>
+            </a:r>
+            <a:r>
+              <a:rPr lang="zh-CN" altLang="en-US" sz="1400" smtClean="0">
+                <a:latin typeface="华文楷体" panose="02010600040101010101" pitchFamily="2" charset="-122"/>
+                <a:ea typeface="华文楷体" panose="02010600040101010101" pitchFamily="2" charset="-122"/>
+              </a:rPr>
+              <a:t>和</a:t>
+            </a:r>
+            <a:r>
+              <a:rPr lang="en-US" altLang="zh-CN" sz="1400" smtClean="0">
+                <a:latin typeface="华文楷体" panose="02010600040101010101" pitchFamily="2" charset="-122"/>
+                <a:ea typeface="华文楷体" panose="02010600040101010101" pitchFamily="2" charset="-122"/>
+              </a:rPr>
+              <a:t>DC-</a:t>
+            </a:r>
+            <a:r>
+              <a:rPr lang="zh-CN" altLang="en-US" sz="1400" smtClean="0">
+                <a:latin typeface="华文楷体" panose="02010600040101010101" pitchFamily="2" charset="-122"/>
+                <a:ea typeface="华文楷体" panose="02010600040101010101" pitchFamily="2" charset="-122"/>
+              </a:rPr>
+              <a:t>没有画出来</a:t>
+            </a:r>
+            <a:endParaRPr lang="zh-CN" altLang="en-US" sz="1400">
               <a:latin typeface="华文楷体" panose="02010600040101010101" pitchFamily="2" charset="-122"/>
               <a:ea typeface="华文楷体" panose="02010600040101010101" pitchFamily="2" charset="-122"/>
             </a:endParaRPr>
@@ -23312,1406 +23781,30 @@
           <a:chExt cx="0" cy="0"/>
         </a:xfrm>
       </p:grpSpPr>
-      <p:sp>
-        <p:nvSpPr>
-          <p:cNvPr id="2" name="文本框 1"/>
-          <p:cNvSpPr txBox="1"/>
-          <p:nvPr/>
-        </p:nvSpPr>
-        <p:spPr>
-          <a:xfrm>
-            <a:off x="2595656" y="3274656"/>
-            <a:ext cx="1470993" cy="307777"/>
-          </a:xfrm>
-          <a:prstGeom prst="rect">
-            <a:avLst/>
-          </a:prstGeom>
-          <a:noFill/>
-          <a:ln w="19050">
-            <a:solidFill>
-              <a:schemeClr val="accent1"/>
-            </a:solidFill>
-          </a:ln>
-        </p:spPr>
-        <p:txBody>
-          <a:bodyPr wrap="square" rtlCol="0">
-            <a:spAutoFit/>
-          </a:bodyPr>
-          <a:lstStyle/>
-          <a:p>
-            <a:pPr algn="ctr"/>
-            <a:r>
-              <a:rPr lang="en-US" altLang="zh-CN" sz="1400" smtClean="0">
-                <a:latin typeface="华文楷体" panose="02010600040101010101" pitchFamily="2" charset="-122"/>
-                <a:ea typeface="华文楷体" panose="02010600040101010101" pitchFamily="2" charset="-122"/>
-              </a:rPr>
-              <a:t>CAN Transceiver</a:t>
-            </a:r>
-          </a:p>
-        </p:txBody>
-      </p:sp>
-      <p:cxnSp>
-        <p:nvCxnSpPr>
-          <p:cNvPr id="4" name="直接连接符 3"/>
-          <p:cNvCxnSpPr/>
-          <p:nvPr/>
-        </p:nvCxnSpPr>
-        <p:spPr>
-          <a:xfrm flipV="1">
-            <a:off x="824948" y="4144930"/>
-            <a:ext cx="10800000" cy="774"/>
-          </a:xfrm>
-          <a:prstGeom prst="line">
-            <a:avLst/>
-          </a:prstGeom>
-          <a:ln w="19050"/>
-        </p:spPr>
-        <p:style>
-          <a:lnRef idx="1">
-            <a:schemeClr val="accent1"/>
-          </a:lnRef>
-          <a:fillRef idx="0">
-            <a:schemeClr val="accent1"/>
-          </a:fillRef>
-          <a:effectRef idx="0">
-            <a:schemeClr val="accent1"/>
-          </a:effectRef>
-          <a:fontRef idx="minor">
-            <a:schemeClr val="tx1"/>
-          </a:fontRef>
-        </p:style>
-      </p:cxnSp>
-      <p:cxnSp>
-        <p:nvCxnSpPr>
-          <p:cNvPr id="10" name="直接连接符 9"/>
-          <p:cNvCxnSpPr/>
-          <p:nvPr/>
-        </p:nvCxnSpPr>
-        <p:spPr>
-          <a:xfrm flipV="1">
-            <a:off x="824948" y="5384450"/>
-            <a:ext cx="10800000" cy="774"/>
-          </a:xfrm>
-          <a:prstGeom prst="line">
-            <a:avLst/>
-          </a:prstGeom>
-          <a:ln w="19050"/>
-        </p:spPr>
-        <p:style>
-          <a:lnRef idx="1">
-            <a:schemeClr val="accent1"/>
-          </a:lnRef>
-          <a:fillRef idx="0">
-            <a:schemeClr val="accent1"/>
-          </a:fillRef>
-          <a:effectRef idx="0">
-            <a:schemeClr val="accent1"/>
-          </a:effectRef>
-          <a:fontRef idx="minor">
-            <a:schemeClr val="tx1"/>
-          </a:fontRef>
-        </p:style>
-      </p:cxnSp>
-      <p:sp>
-        <p:nvSpPr>
-          <p:cNvPr id="11" name="矩形 10"/>
-          <p:cNvSpPr/>
-          <p:nvPr/>
-        </p:nvSpPr>
-        <p:spPr>
-          <a:xfrm>
-            <a:off x="753828" y="4526317"/>
-            <a:ext cx="142240" cy="477520"/>
-          </a:xfrm>
-          <a:prstGeom prst="rect">
-            <a:avLst/>
-          </a:prstGeom>
-        </p:spPr>
-        <p:style>
-          <a:lnRef idx="2">
-            <a:schemeClr val="accent1">
-              <a:shade val="50000"/>
-            </a:schemeClr>
-          </a:lnRef>
-          <a:fillRef idx="1">
-            <a:schemeClr val="accent1"/>
-          </a:fillRef>
-          <a:effectRef idx="0">
-            <a:schemeClr val="accent1"/>
-          </a:effectRef>
-          <a:fontRef idx="minor">
-            <a:schemeClr val="lt1"/>
-          </a:fontRef>
-        </p:style>
-        <p:txBody>
-          <a:bodyPr rtlCol="0" anchor="ctr"/>
-          <a:lstStyle/>
-          <a:p>
-            <a:pPr algn="ctr"/>
-            <a:endParaRPr lang="zh-CN" altLang="en-US"/>
-          </a:p>
-        </p:txBody>
-      </p:sp>
-      <p:sp>
-        <p:nvSpPr>
-          <p:cNvPr id="12" name="矩形 11"/>
-          <p:cNvSpPr/>
-          <p:nvPr/>
-        </p:nvSpPr>
-        <p:spPr>
-          <a:xfrm>
-            <a:off x="11553828" y="4526317"/>
-            <a:ext cx="142240" cy="477520"/>
-          </a:xfrm>
-          <a:prstGeom prst="rect">
-            <a:avLst/>
-          </a:prstGeom>
-        </p:spPr>
-        <p:style>
-          <a:lnRef idx="2">
-            <a:schemeClr val="accent1">
-              <a:shade val="50000"/>
-            </a:schemeClr>
-          </a:lnRef>
-          <a:fillRef idx="1">
-            <a:schemeClr val="accent1"/>
-          </a:fillRef>
-          <a:effectRef idx="0">
-            <a:schemeClr val="accent1"/>
-          </a:effectRef>
-          <a:fontRef idx="minor">
-            <a:schemeClr val="lt1"/>
-          </a:fontRef>
-        </p:style>
-        <p:txBody>
-          <a:bodyPr rtlCol="0" anchor="ctr"/>
-          <a:lstStyle/>
-          <a:p>
-            <a:pPr algn="ctr"/>
-            <a:endParaRPr lang="zh-CN" altLang="en-US"/>
-          </a:p>
-        </p:txBody>
-      </p:sp>
-      <p:cxnSp>
-        <p:nvCxnSpPr>
-          <p:cNvPr id="14" name="直接连接符 13"/>
-          <p:cNvCxnSpPr>
-            <a:stCxn id="11" idx="0"/>
-          </p:cNvCxnSpPr>
-          <p:nvPr/>
-        </p:nvCxnSpPr>
-        <p:spPr>
-          <a:xfrm flipV="1">
-            <a:off x="824948" y="4144930"/>
-            <a:ext cx="0" cy="381387"/>
-          </a:xfrm>
-          <a:prstGeom prst="line">
-            <a:avLst/>
-          </a:prstGeom>
-          <a:ln w="19050"/>
-        </p:spPr>
-        <p:style>
-          <a:lnRef idx="1">
-            <a:schemeClr val="accent1"/>
-          </a:lnRef>
-          <a:fillRef idx="0">
-            <a:schemeClr val="accent1"/>
-          </a:fillRef>
-          <a:effectRef idx="0">
-            <a:schemeClr val="accent1"/>
-          </a:effectRef>
-          <a:fontRef idx="minor">
-            <a:schemeClr val="tx1"/>
-          </a:fontRef>
-        </p:style>
-      </p:cxnSp>
-      <p:cxnSp>
-        <p:nvCxnSpPr>
-          <p:cNvPr id="16" name="直接连接符 15"/>
-          <p:cNvCxnSpPr>
-            <a:endCxn id="11" idx="2"/>
-          </p:cNvCxnSpPr>
-          <p:nvPr/>
-        </p:nvCxnSpPr>
-        <p:spPr>
-          <a:xfrm flipV="1">
-            <a:off x="824948" y="5003837"/>
-            <a:ext cx="0" cy="380613"/>
-          </a:xfrm>
-          <a:prstGeom prst="line">
-            <a:avLst/>
-          </a:prstGeom>
-          <a:ln w="19050"/>
-        </p:spPr>
-        <p:style>
-          <a:lnRef idx="1">
-            <a:schemeClr val="accent1"/>
-          </a:lnRef>
-          <a:fillRef idx="0">
-            <a:schemeClr val="accent1"/>
-          </a:fillRef>
-          <a:effectRef idx="0">
-            <a:schemeClr val="accent1"/>
-          </a:effectRef>
-          <a:fontRef idx="minor">
-            <a:schemeClr val="tx1"/>
-          </a:fontRef>
-        </p:style>
-      </p:cxnSp>
-      <p:cxnSp>
-        <p:nvCxnSpPr>
-          <p:cNvPr id="18" name="直接连接符 17"/>
-          <p:cNvCxnSpPr>
-            <a:stCxn id="12" idx="0"/>
-          </p:cNvCxnSpPr>
-          <p:nvPr/>
-        </p:nvCxnSpPr>
-        <p:spPr>
-          <a:xfrm flipV="1">
-            <a:off x="11624948" y="4144930"/>
-            <a:ext cx="0" cy="381387"/>
-          </a:xfrm>
-          <a:prstGeom prst="line">
-            <a:avLst/>
-          </a:prstGeom>
-          <a:ln w="19050"/>
-        </p:spPr>
-        <p:style>
-          <a:lnRef idx="1">
-            <a:schemeClr val="accent1"/>
-          </a:lnRef>
-          <a:fillRef idx="0">
-            <a:schemeClr val="accent1"/>
-          </a:fillRef>
-          <a:effectRef idx="0">
-            <a:schemeClr val="accent1"/>
-          </a:effectRef>
-          <a:fontRef idx="minor">
-            <a:schemeClr val="tx1"/>
-          </a:fontRef>
-        </p:style>
-      </p:cxnSp>
-      <p:cxnSp>
-        <p:nvCxnSpPr>
-          <p:cNvPr id="20" name="直接连接符 19"/>
-          <p:cNvCxnSpPr>
-            <a:stCxn id="12" idx="2"/>
-          </p:cNvCxnSpPr>
-          <p:nvPr/>
-        </p:nvCxnSpPr>
-        <p:spPr>
-          <a:xfrm>
-            <a:off x="11624948" y="5003837"/>
-            <a:ext cx="0" cy="380613"/>
-          </a:xfrm>
-          <a:prstGeom prst="line">
-            <a:avLst/>
-          </a:prstGeom>
-          <a:ln w="19050"/>
-        </p:spPr>
-        <p:style>
-          <a:lnRef idx="1">
-            <a:schemeClr val="accent1"/>
-          </a:lnRef>
-          <a:fillRef idx="0">
-            <a:schemeClr val="accent1"/>
-          </a:fillRef>
-          <a:effectRef idx="0">
-            <a:schemeClr val="accent1"/>
-          </a:effectRef>
-          <a:fontRef idx="minor">
-            <a:schemeClr val="tx1"/>
-          </a:fontRef>
-        </p:style>
-      </p:cxnSp>
-      <p:cxnSp>
-        <p:nvCxnSpPr>
-          <p:cNvPr id="22" name="直接连接符 21"/>
-          <p:cNvCxnSpPr/>
-          <p:nvPr/>
-        </p:nvCxnSpPr>
-        <p:spPr>
-          <a:xfrm>
-            <a:off x="2851150" y="3568930"/>
-            <a:ext cx="0" cy="576000"/>
-          </a:xfrm>
-          <a:prstGeom prst="line">
-            <a:avLst/>
-          </a:prstGeom>
-          <a:ln w="19050"/>
-        </p:spPr>
-        <p:style>
-          <a:lnRef idx="1">
-            <a:schemeClr val="accent1"/>
-          </a:lnRef>
-          <a:fillRef idx="0">
-            <a:schemeClr val="accent1"/>
-          </a:fillRef>
-          <a:effectRef idx="0">
-            <a:schemeClr val="accent1"/>
-          </a:effectRef>
-          <a:fontRef idx="minor">
-            <a:schemeClr val="tx1"/>
-          </a:fontRef>
-        </p:style>
-      </p:cxnSp>
-      <p:cxnSp>
-        <p:nvCxnSpPr>
-          <p:cNvPr id="25" name="直接连接符 24"/>
-          <p:cNvCxnSpPr/>
-          <p:nvPr/>
-        </p:nvCxnSpPr>
-        <p:spPr>
-          <a:xfrm>
-            <a:off x="3741421" y="3584450"/>
-            <a:ext cx="7620" cy="1800000"/>
-          </a:xfrm>
-          <a:prstGeom prst="line">
-            <a:avLst/>
-          </a:prstGeom>
-          <a:ln w="19050"/>
-        </p:spPr>
-        <p:style>
-          <a:lnRef idx="1">
-            <a:schemeClr val="accent1"/>
-          </a:lnRef>
-          <a:fillRef idx="0">
-            <a:schemeClr val="accent1"/>
-          </a:fillRef>
-          <a:effectRef idx="0">
-            <a:schemeClr val="accent1"/>
-          </a:effectRef>
-          <a:fontRef idx="minor">
-            <a:schemeClr val="tx1"/>
-          </a:fontRef>
-        </p:style>
-      </p:cxnSp>
-      <p:sp>
-        <p:nvSpPr>
-          <p:cNvPr id="26" name="文本框 25"/>
-          <p:cNvSpPr txBox="1"/>
-          <p:nvPr/>
-        </p:nvSpPr>
-        <p:spPr>
-          <a:xfrm>
-            <a:off x="2171587" y="2371682"/>
-            <a:ext cx="2319133" cy="307777"/>
-          </a:xfrm>
-          <a:prstGeom prst="rect">
-            <a:avLst/>
-          </a:prstGeom>
-          <a:noFill/>
-          <a:ln>
-            <a:solidFill>
-              <a:schemeClr val="accent1"/>
-            </a:solidFill>
-          </a:ln>
-        </p:spPr>
-        <p:txBody>
-          <a:bodyPr wrap="square" rtlCol="0">
-            <a:spAutoFit/>
-          </a:bodyPr>
-          <a:lstStyle/>
-          <a:p>
-            <a:pPr algn="ctr"/>
-            <a:r>
-              <a:rPr lang="en-US" altLang="zh-CN" sz="1400" smtClean="0">
-                <a:latin typeface="华文楷体" panose="02010600040101010101" pitchFamily="2" charset="-122"/>
-                <a:ea typeface="华文楷体" panose="02010600040101010101" pitchFamily="2" charset="-122"/>
-              </a:rPr>
-              <a:t>CAN Controller</a:t>
-            </a:r>
-            <a:r>
-              <a:rPr lang="zh-CN" altLang="en-US" sz="1400" smtClean="0">
-                <a:latin typeface="华文楷体" panose="02010600040101010101" pitchFamily="2" charset="-122"/>
-                <a:ea typeface="华文楷体" panose="02010600040101010101" pitchFamily="2" charset="-122"/>
-              </a:rPr>
-              <a:t>（</a:t>
-            </a:r>
-            <a:r>
-              <a:rPr lang="en-US" altLang="zh-CN" sz="1400" smtClean="0">
-                <a:latin typeface="华文楷体" panose="02010600040101010101" pitchFamily="2" charset="-122"/>
-                <a:ea typeface="华文楷体" panose="02010600040101010101" pitchFamily="2" charset="-122"/>
-              </a:rPr>
-              <a:t>peripheral</a:t>
-            </a:r>
-            <a:r>
-              <a:rPr lang="zh-CN" altLang="en-US" sz="1400" smtClean="0">
-                <a:latin typeface="华文楷体" panose="02010600040101010101" pitchFamily="2" charset="-122"/>
-                <a:ea typeface="华文楷体" panose="02010600040101010101" pitchFamily="2" charset="-122"/>
-              </a:rPr>
-              <a:t>）</a:t>
-            </a:r>
-            <a:endParaRPr lang="zh-CN" altLang="en-US" sz="1400">
-              <a:latin typeface="华文楷体" panose="02010600040101010101" pitchFamily="2" charset="-122"/>
-              <a:ea typeface="华文楷体" panose="02010600040101010101" pitchFamily="2" charset="-122"/>
-            </a:endParaRPr>
-          </a:p>
-        </p:txBody>
-      </p:sp>
-      <p:sp>
-        <p:nvSpPr>
-          <p:cNvPr id="27" name="矩形 26"/>
-          <p:cNvSpPr/>
-          <p:nvPr/>
-        </p:nvSpPr>
-        <p:spPr>
-          <a:xfrm>
-            <a:off x="1939233" y="1607450"/>
-            <a:ext cx="2783840" cy="1185372"/>
-          </a:xfrm>
-          <a:prstGeom prst="rect">
-            <a:avLst/>
-          </a:prstGeom>
-          <a:noFill/>
-          <a:ln w="19050">
-            <a:solidFill>
-              <a:schemeClr val="tx1"/>
-            </a:solidFill>
-          </a:ln>
-        </p:spPr>
-        <p:style>
-          <a:lnRef idx="2">
-            <a:schemeClr val="accent1">
-              <a:shade val="50000"/>
-            </a:schemeClr>
-          </a:lnRef>
-          <a:fillRef idx="1">
-            <a:schemeClr val="accent1"/>
-          </a:fillRef>
-          <a:effectRef idx="0">
-            <a:schemeClr val="accent1"/>
-          </a:effectRef>
-          <a:fontRef idx="minor">
-            <a:schemeClr val="lt1"/>
-          </a:fontRef>
-        </p:style>
-        <p:txBody>
-          <a:bodyPr rtlCol="0" anchor="ctr"/>
-          <a:lstStyle/>
-          <a:p>
-            <a:pPr algn="ctr"/>
-            <a:endParaRPr lang="zh-CN" altLang="en-US"/>
-          </a:p>
-        </p:txBody>
-      </p:sp>
-      <p:sp>
-        <p:nvSpPr>
-          <p:cNvPr id="28" name="文本框 27"/>
-          <p:cNvSpPr txBox="1"/>
-          <p:nvPr/>
-        </p:nvSpPr>
-        <p:spPr>
-          <a:xfrm>
-            <a:off x="2531825" y="1856527"/>
-            <a:ext cx="1598654" cy="369332"/>
-          </a:xfrm>
-          <a:prstGeom prst="rect">
-            <a:avLst/>
-          </a:prstGeom>
-          <a:noFill/>
-        </p:spPr>
-        <p:txBody>
-          <a:bodyPr wrap="square" rtlCol="0">
-            <a:spAutoFit/>
-          </a:bodyPr>
-          <a:lstStyle/>
-          <a:p>
-            <a:pPr algn="ctr"/>
-            <a:r>
-              <a:rPr lang="en-US" altLang="zh-CN" b="1" smtClean="0">
-                <a:latin typeface="华文楷体" panose="02010600040101010101" pitchFamily="2" charset="-122"/>
-                <a:ea typeface="华文楷体" panose="02010600040101010101" pitchFamily="2" charset="-122"/>
-              </a:rPr>
-              <a:t>MCU</a:t>
-            </a:r>
-            <a:endParaRPr lang="zh-CN" altLang="en-US" b="1">
-              <a:latin typeface="华文楷体" panose="02010600040101010101" pitchFamily="2" charset="-122"/>
-              <a:ea typeface="华文楷体" panose="02010600040101010101" pitchFamily="2" charset="-122"/>
-            </a:endParaRPr>
-          </a:p>
-        </p:txBody>
-      </p:sp>
-      <p:sp>
-        <p:nvSpPr>
-          <p:cNvPr id="29" name="矩形 28"/>
-          <p:cNvSpPr/>
-          <p:nvPr/>
-        </p:nvSpPr>
-        <p:spPr>
-          <a:xfrm>
-            <a:off x="1635760" y="1399382"/>
-            <a:ext cx="3434080" cy="2471051"/>
-          </a:xfrm>
-          <a:prstGeom prst="rect">
-            <a:avLst/>
-          </a:prstGeom>
-          <a:noFill/>
-          <a:ln w="28575">
-            <a:solidFill>
-              <a:srgbClr val="C00000"/>
-            </a:solidFill>
-          </a:ln>
-        </p:spPr>
-        <p:style>
-          <a:lnRef idx="2">
-            <a:schemeClr val="accent1">
-              <a:shade val="50000"/>
-            </a:schemeClr>
-          </a:lnRef>
-          <a:fillRef idx="1">
-            <a:schemeClr val="accent1"/>
-          </a:fillRef>
-          <a:effectRef idx="0">
-            <a:schemeClr val="accent1"/>
-          </a:effectRef>
-          <a:fontRef idx="minor">
-            <a:schemeClr val="lt1"/>
-          </a:fontRef>
-        </p:style>
-        <p:txBody>
-          <a:bodyPr rtlCol="0" anchor="ctr"/>
-          <a:lstStyle/>
-          <a:p>
-            <a:pPr algn="ctr"/>
-            <a:endParaRPr lang="zh-CN" altLang="en-US"/>
-          </a:p>
-        </p:txBody>
-      </p:sp>
-      <p:sp>
-        <p:nvSpPr>
-          <p:cNvPr id="30" name="文本框 29"/>
-          <p:cNvSpPr txBox="1"/>
-          <p:nvPr/>
-        </p:nvSpPr>
-        <p:spPr>
-          <a:xfrm>
-            <a:off x="2660231" y="924560"/>
-            <a:ext cx="1341842" cy="523220"/>
-          </a:xfrm>
-          <a:prstGeom prst="rect">
-            <a:avLst/>
-          </a:prstGeom>
-          <a:noFill/>
-        </p:spPr>
-        <p:txBody>
-          <a:bodyPr wrap="square" rtlCol="0">
-            <a:spAutoFit/>
-          </a:bodyPr>
-          <a:lstStyle/>
-          <a:p>
-            <a:pPr algn="ctr"/>
-            <a:r>
-              <a:rPr lang="en-US" altLang="zh-CN" sz="2800" b="1" smtClean="0">
-                <a:solidFill>
-                  <a:srgbClr val="7030A0"/>
-                </a:solidFill>
-                <a:latin typeface="华文楷体" panose="02010600040101010101" pitchFamily="2" charset="-122"/>
-                <a:ea typeface="华文楷体" panose="02010600040101010101" pitchFamily="2" charset="-122"/>
-              </a:rPr>
-              <a:t>Node</a:t>
-            </a:r>
-            <a:endParaRPr lang="zh-CN" altLang="en-US" sz="2800" b="1">
-              <a:solidFill>
-                <a:srgbClr val="7030A0"/>
-              </a:solidFill>
-              <a:latin typeface="华文楷体" panose="02010600040101010101" pitchFamily="2" charset="-122"/>
-              <a:ea typeface="华文楷体" panose="02010600040101010101" pitchFamily="2" charset="-122"/>
-            </a:endParaRPr>
-          </a:p>
-        </p:txBody>
-      </p:sp>
-      <p:cxnSp>
-        <p:nvCxnSpPr>
-          <p:cNvPr id="32" name="直接箭头连接符 31"/>
-          <p:cNvCxnSpPr/>
-          <p:nvPr/>
-        </p:nvCxnSpPr>
-        <p:spPr>
-          <a:xfrm>
-            <a:off x="2851150" y="2792822"/>
-            <a:ext cx="0" cy="481834"/>
-          </a:xfrm>
-          <a:prstGeom prst="straightConnector1">
-            <a:avLst/>
-          </a:prstGeom>
-          <a:ln>
-            <a:tailEnd type="triangle"/>
-          </a:ln>
-        </p:spPr>
-        <p:style>
-          <a:lnRef idx="1">
-            <a:schemeClr val="accent1"/>
-          </a:lnRef>
-          <a:fillRef idx="0">
-            <a:schemeClr val="accent1"/>
-          </a:fillRef>
-          <a:effectRef idx="0">
-            <a:schemeClr val="accent1"/>
-          </a:effectRef>
-          <a:fontRef idx="minor">
-            <a:schemeClr val="tx1"/>
-          </a:fontRef>
-        </p:style>
-      </p:cxnSp>
-      <p:cxnSp>
-        <p:nvCxnSpPr>
-          <p:cNvPr id="34" name="直接箭头连接符 33"/>
-          <p:cNvCxnSpPr/>
-          <p:nvPr/>
-        </p:nvCxnSpPr>
-        <p:spPr>
-          <a:xfrm flipV="1">
-            <a:off x="3761740" y="2792822"/>
-            <a:ext cx="0" cy="481834"/>
-          </a:xfrm>
-          <a:prstGeom prst="straightConnector1">
-            <a:avLst/>
-          </a:prstGeom>
-          <a:ln>
-            <a:tailEnd type="triangle"/>
-          </a:ln>
-        </p:spPr>
-        <p:style>
-          <a:lnRef idx="1">
-            <a:schemeClr val="accent1"/>
-          </a:lnRef>
-          <a:fillRef idx="0">
-            <a:schemeClr val="accent1"/>
-          </a:fillRef>
-          <a:effectRef idx="0">
-            <a:schemeClr val="accent1"/>
-          </a:effectRef>
-          <a:fontRef idx="minor">
-            <a:schemeClr val="tx1"/>
-          </a:fontRef>
-        </p:style>
-      </p:cxnSp>
-      <p:sp>
-        <p:nvSpPr>
-          <p:cNvPr id="35" name="文本框 34"/>
-          <p:cNvSpPr txBox="1"/>
-          <p:nvPr/>
-        </p:nvSpPr>
-        <p:spPr>
-          <a:xfrm>
-            <a:off x="1901738" y="2830802"/>
-            <a:ext cx="1036320" cy="307777"/>
-          </a:xfrm>
-          <a:prstGeom prst="rect">
-            <a:avLst/>
-          </a:prstGeom>
-          <a:noFill/>
-        </p:spPr>
-        <p:txBody>
-          <a:bodyPr wrap="square" rtlCol="0">
-            <a:spAutoFit/>
-          </a:bodyPr>
-          <a:lstStyle/>
-          <a:p>
-            <a:pPr algn="ctr"/>
-            <a:r>
-              <a:rPr lang="en-US" altLang="zh-CN" sz="1400" smtClean="0">
-                <a:latin typeface="华文楷体" panose="02010600040101010101" pitchFamily="2" charset="-122"/>
-                <a:ea typeface="华文楷体" panose="02010600040101010101" pitchFamily="2" charset="-122"/>
-              </a:rPr>
-              <a:t>can_Tx_pin</a:t>
-            </a:r>
-            <a:endParaRPr lang="zh-CN" altLang="en-US" sz="1400">
-              <a:latin typeface="华文楷体" panose="02010600040101010101" pitchFamily="2" charset="-122"/>
-              <a:ea typeface="华文楷体" panose="02010600040101010101" pitchFamily="2" charset="-122"/>
-            </a:endParaRPr>
-          </a:p>
-        </p:txBody>
-      </p:sp>
-      <p:sp>
-        <p:nvSpPr>
-          <p:cNvPr id="36" name="文本框 35"/>
-          <p:cNvSpPr txBox="1"/>
-          <p:nvPr/>
-        </p:nvSpPr>
-        <p:spPr>
-          <a:xfrm>
-            <a:off x="3761740" y="2840215"/>
-            <a:ext cx="1036320" cy="307777"/>
-          </a:xfrm>
-          <a:prstGeom prst="rect">
-            <a:avLst/>
-          </a:prstGeom>
-          <a:noFill/>
-        </p:spPr>
-        <p:txBody>
-          <a:bodyPr wrap="square" rtlCol="0">
-            <a:spAutoFit/>
-          </a:bodyPr>
-          <a:lstStyle/>
-          <a:p>
-            <a:pPr algn="ctr"/>
-            <a:r>
-              <a:rPr lang="en-US" altLang="zh-CN" sz="1400" smtClean="0">
-                <a:latin typeface="华文楷体" panose="02010600040101010101" pitchFamily="2" charset="-122"/>
-                <a:ea typeface="华文楷体" panose="02010600040101010101" pitchFamily="2" charset="-122"/>
-              </a:rPr>
-              <a:t>can_Rx_pin</a:t>
-            </a:r>
-            <a:endParaRPr lang="zh-CN" altLang="en-US" sz="1400">
-              <a:latin typeface="华文楷体" panose="02010600040101010101" pitchFamily="2" charset="-122"/>
-              <a:ea typeface="华文楷体" panose="02010600040101010101" pitchFamily="2" charset="-122"/>
-            </a:endParaRPr>
-          </a:p>
-        </p:txBody>
-      </p:sp>
-      <p:sp>
-        <p:nvSpPr>
-          <p:cNvPr id="37" name="矩形 36"/>
-          <p:cNvSpPr/>
-          <p:nvPr/>
-        </p:nvSpPr>
-        <p:spPr>
-          <a:xfrm>
-            <a:off x="6224948" y="3287200"/>
-            <a:ext cx="731521" cy="589259"/>
-          </a:xfrm>
-          <a:prstGeom prst="rect">
-            <a:avLst/>
-          </a:prstGeom>
-          <a:noFill/>
-          <a:ln w="28575">
-            <a:solidFill>
-              <a:srgbClr val="C00000"/>
-            </a:solidFill>
-          </a:ln>
-        </p:spPr>
-        <p:style>
-          <a:lnRef idx="2">
-            <a:schemeClr val="accent1">
-              <a:shade val="50000"/>
-            </a:schemeClr>
-          </a:lnRef>
-          <a:fillRef idx="1">
-            <a:schemeClr val="accent1"/>
-          </a:fillRef>
-          <a:effectRef idx="0">
-            <a:schemeClr val="accent1"/>
-          </a:effectRef>
-          <a:fontRef idx="minor">
-            <a:schemeClr val="lt1"/>
-          </a:fontRef>
-        </p:style>
-        <p:txBody>
-          <a:bodyPr rtlCol="0" anchor="ctr"/>
-          <a:lstStyle/>
-          <a:p>
-            <a:pPr algn="ctr"/>
-            <a:endParaRPr lang="zh-CN" altLang="en-US"/>
-          </a:p>
-        </p:txBody>
-      </p:sp>
-      <p:sp>
-        <p:nvSpPr>
-          <p:cNvPr id="38" name="矩形 37"/>
-          <p:cNvSpPr/>
-          <p:nvPr/>
-        </p:nvSpPr>
-        <p:spPr>
-          <a:xfrm>
-            <a:off x="7900352" y="3274656"/>
-            <a:ext cx="731521" cy="589259"/>
-          </a:xfrm>
-          <a:prstGeom prst="rect">
-            <a:avLst/>
-          </a:prstGeom>
-          <a:noFill/>
-          <a:ln w="28575">
-            <a:solidFill>
-              <a:srgbClr val="C00000"/>
-            </a:solidFill>
-          </a:ln>
-        </p:spPr>
-        <p:style>
-          <a:lnRef idx="2">
-            <a:schemeClr val="accent1">
-              <a:shade val="50000"/>
-            </a:schemeClr>
-          </a:lnRef>
-          <a:fillRef idx="1">
-            <a:schemeClr val="accent1"/>
-          </a:fillRef>
-          <a:effectRef idx="0">
-            <a:schemeClr val="accent1"/>
-          </a:effectRef>
-          <a:fontRef idx="minor">
-            <a:schemeClr val="lt1"/>
-          </a:fontRef>
-        </p:style>
-        <p:txBody>
-          <a:bodyPr rtlCol="0" anchor="ctr"/>
-          <a:lstStyle/>
-          <a:p>
-            <a:pPr algn="ctr"/>
-            <a:endParaRPr lang="zh-CN" altLang="en-US"/>
-          </a:p>
-        </p:txBody>
-      </p:sp>
-      <p:sp>
-        <p:nvSpPr>
-          <p:cNvPr id="39" name="矩形 38"/>
-          <p:cNvSpPr/>
-          <p:nvPr/>
-        </p:nvSpPr>
-        <p:spPr>
-          <a:xfrm>
-            <a:off x="9577206" y="3287200"/>
-            <a:ext cx="731521" cy="589259"/>
-          </a:xfrm>
-          <a:prstGeom prst="rect">
-            <a:avLst/>
-          </a:prstGeom>
-          <a:noFill/>
-          <a:ln w="28575">
-            <a:solidFill>
-              <a:srgbClr val="C00000"/>
-            </a:solidFill>
-          </a:ln>
-        </p:spPr>
-        <p:style>
-          <a:lnRef idx="2">
-            <a:schemeClr val="accent1">
-              <a:shade val="50000"/>
-            </a:schemeClr>
-          </a:lnRef>
-          <a:fillRef idx="1">
-            <a:schemeClr val="accent1"/>
-          </a:fillRef>
-          <a:effectRef idx="0">
-            <a:schemeClr val="accent1"/>
-          </a:effectRef>
-          <a:fontRef idx="minor">
-            <a:schemeClr val="lt1"/>
-          </a:fontRef>
-        </p:style>
-        <p:txBody>
-          <a:bodyPr rtlCol="0" anchor="ctr"/>
-          <a:lstStyle/>
-          <a:p>
-            <a:pPr algn="ctr"/>
-            <a:endParaRPr lang="zh-CN" altLang="en-US"/>
-          </a:p>
-        </p:txBody>
-      </p:sp>
-      <p:sp>
-        <p:nvSpPr>
-          <p:cNvPr id="40" name="文本框 39"/>
-          <p:cNvSpPr txBox="1"/>
-          <p:nvPr/>
-        </p:nvSpPr>
-        <p:spPr>
-          <a:xfrm>
-            <a:off x="7595191" y="2822740"/>
-            <a:ext cx="1341842" cy="523220"/>
-          </a:xfrm>
-          <a:prstGeom prst="rect">
-            <a:avLst/>
-          </a:prstGeom>
-          <a:noFill/>
-        </p:spPr>
-        <p:txBody>
-          <a:bodyPr wrap="square" rtlCol="0">
-            <a:spAutoFit/>
-          </a:bodyPr>
-          <a:lstStyle/>
-          <a:p>
-            <a:pPr algn="ctr"/>
-            <a:r>
-              <a:rPr lang="en-US" altLang="zh-CN" sz="2800" smtClean="0">
-                <a:solidFill>
-                  <a:srgbClr val="7030A0"/>
-                </a:solidFill>
-                <a:latin typeface="华文楷体" panose="02010600040101010101" pitchFamily="2" charset="-122"/>
-                <a:ea typeface="华文楷体" panose="02010600040101010101" pitchFamily="2" charset="-122"/>
-              </a:rPr>
-              <a:t>Node</a:t>
-            </a:r>
-            <a:endParaRPr lang="zh-CN" altLang="en-US" sz="2800">
-              <a:solidFill>
-                <a:srgbClr val="7030A0"/>
-              </a:solidFill>
-              <a:latin typeface="华文楷体" panose="02010600040101010101" pitchFamily="2" charset="-122"/>
-              <a:ea typeface="华文楷体" panose="02010600040101010101" pitchFamily="2" charset="-122"/>
-            </a:endParaRPr>
-          </a:p>
-        </p:txBody>
-      </p:sp>
-      <p:sp>
-        <p:nvSpPr>
-          <p:cNvPr id="41" name="文本框 40"/>
-          <p:cNvSpPr txBox="1"/>
-          <p:nvPr/>
-        </p:nvSpPr>
-        <p:spPr>
-          <a:xfrm>
-            <a:off x="5919787" y="2823956"/>
-            <a:ext cx="1341842" cy="523220"/>
-          </a:xfrm>
-          <a:prstGeom prst="rect">
-            <a:avLst/>
-          </a:prstGeom>
-          <a:noFill/>
-        </p:spPr>
-        <p:txBody>
-          <a:bodyPr wrap="square" rtlCol="0">
-            <a:spAutoFit/>
-          </a:bodyPr>
-          <a:lstStyle/>
-          <a:p>
-            <a:pPr algn="ctr"/>
-            <a:r>
-              <a:rPr lang="en-US" altLang="zh-CN" sz="2800" b="1" smtClean="0">
-                <a:solidFill>
-                  <a:srgbClr val="7030A0"/>
-                </a:solidFill>
-                <a:latin typeface="华文楷体" panose="02010600040101010101" pitchFamily="2" charset="-122"/>
-                <a:ea typeface="华文楷体" panose="02010600040101010101" pitchFamily="2" charset="-122"/>
-              </a:rPr>
-              <a:t>Node</a:t>
-            </a:r>
-            <a:endParaRPr lang="zh-CN" altLang="en-US" sz="2800" b="1">
-              <a:solidFill>
-                <a:srgbClr val="7030A0"/>
-              </a:solidFill>
-              <a:latin typeface="华文楷体" panose="02010600040101010101" pitchFamily="2" charset="-122"/>
-              <a:ea typeface="华文楷体" panose="02010600040101010101" pitchFamily="2" charset="-122"/>
-            </a:endParaRPr>
-          </a:p>
-        </p:txBody>
-      </p:sp>
-      <p:sp>
-        <p:nvSpPr>
-          <p:cNvPr id="42" name="文本框 41"/>
-          <p:cNvSpPr txBox="1"/>
-          <p:nvPr/>
-        </p:nvSpPr>
-        <p:spPr>
-          <a:xfrm>
-            <a:off x="9272045" y="2831342"/>
-            <a:ext cx="1341842" cy="523220"/>
-          </a:xfrm>
-          <a:prstGeom prst="rect">
-            <a:avLst/>
-          </a:prstGeom>
-          <a:noFill/>
-        </p:spPr>
-        <p:txBody>
-          <a:bodyPr wrap="square" rtlCol="0">
-            <a:spAutoFit/>
-          </a:bodyPr>
-          <a:lstStyle/>
-          <a:p>
-            <a:pPr algn="ctr"/>
-            <a:r>
-              <a:rPr lang="en-US" altLang="zh-CN" sz="2800" b="1" smtClean="0">
-                <a:solidFill>
-                  <a:srgbClr val="7030A0"/>
-                </a:solidFill>
-                <a:latin typeface="华文楷体" panose="02010600040101010101" pitchFamily="2" charset="-122"/>
-                <a:ea typeface="华文楷体" panose="02010600040101010101" pitchFamily="2" charset="-122"/>
-              </a:rPr>
-              <a:t>Node</a:t>
-            </a:r>
-            <a:endParaRPr lang="zh-CN" altLang="en-US" sz="2800" b="1">
-              <a:solidFill>
-                <a:srgbClr val="7030A0"/>
-              </a:solidFill>
-              <a:latin typeface="华文楷体" panose="02010600040101010101" pitchFamily="2" charset="-122"/>
-              <a:ea typeface="华文楷体" panose="02010600040101010101" pitchFamily="2" charset="-122"/>
-            </a:endParaRPr>
-          </a:p>
-        </p:txBody>
-      </p:sp>
-      <p:sp>
-        <p:nvSpPr>
-          <p:cNvPr id="43" name="文本框 42"/>
-          <p:cNvSpPr txBox="1"/>
-          <p:nvPr/>
-        </p:nvSpPr>
-        <p:spPr>
-          <a:xfrm>
-            <a:off x="1943100" y="3846979"/>
-            <a:ext cx="1036320" cy="338554"/>
-          </a:xfrm>
-          <a:prstGeom prst="rect">
-            <a:avLst/>
-          </a:prstGeom>
-          <a:noFill/>
-        </p:spPr>
-        <p:txBody>
-          <a:bodyPr wrap="square" rtlCol="0">
-            <a:spAutoFit/>
-          </a:bodyPr>
-          <a:lstStyle/>
-          <a:p>
-            <a:pPr algn="ctr"/>
-            <a:r>
-              <a:rPr lang="en-US" altLang="zh-CN" sz="1600" smtClean="0">
-                <a:latin typeface="华文楷体" panose="02010600040101010101" pitchFamily="2" charset="-122"/>
-                <a:ea typeface="华文楷体" panose="02010600040101010101" pitchFamily="2" charset="-122"/>
-              </a:rPr>
-              <a:t>CAN_H</a:t>
-            </a:r>
-            <a:endParaRPr lang="zh-CN" altLang="en-US" sz="1600">
-              <a:latin typeface="华文楷体" panose="02010600040101010101" pitchFamily="2" charset="-122"/>
-              <a:ea typeface="华文楷体" panose="02010600040101010101" pitchFamily="2" charset="-122"/>
-            </a:endParaRPr>
-          </a:p>
-        </p:txBody>
-      </p:sp>
-      <p:sp>
-        <p:nvSpPr>
-          <p:cNvPr id="44" name="文本框 43"/>
-          <p:cNvSpPr txBox="1"/>
-          <p:nvPr/>
-        </p:nvSpPr>
-        <p:spPr>
-          <a:xfrm>
-            <a:off x="2852968" y="4164707"/>
-            <a:ext cx="1036320" cy="338554"/>
-          </a:xfrm>
-          <a:prstGeom prst="rect">
-            <a:avLst/>
-          </a:prstGeom>
-          <a:noFill/>
-        </p:spPr>
-        <p:txBody>
-          <a:bodyPr wrap="square" rtlCol="0">
-            <a:spAutoFit/>
-          </a:bodyPr>
-          <a:lstStyle/>
-          <a:p>
-            <a:pPr algn="ctr"/>
-            <a:r>
-              <a:rPr lang="en-US" altLang="zh-CN" sz="1600" smtClean="0">
-                <a:latin typeface="华文楷体" panose="02010600040101010101" pitchFamily="2" charset="-122"/>
-                <a:ea typeface="华文楷体" panose="02010600040101010101" pitchFamily="2" charset="-122"/>
-              </a:rPr>
-              <a:t>CAN_L</a:t>
-            </a:r>
-            <a:endParaRPr lang="zh-CN" altLang="en-US" sz="1600">
-              <a:latin typeface="华文楷体" panose="02010600040101010101" pitchFamily="2" charset="-122"/>
-              <a:ea typeface="华文楷体" panose="02010600040101010101" pitchFamily="2" charset="-122"/>
-            </a:endParaRPr>
-          </a:p>
-        </p:txBody>
-      </p:sp>
-      <p:cxnSp>
-        <p:nvCxnSpPr>
-          <p:cNvPr id="50" name="直接连接符 49"/>
-          <p:cNvCxnSpPr/>
-          <p:nvPr/>
-        </p:nvCxnSpPr>
-        <p:spPr>
-          <a:xfrm>
-            <a:off x="6365240" y="3863915"/>
-            <a:ext cx="0" cy="288000"/>
-          </a:xfrm>
-          <a:prstGeom prst="line">
-            <a:avLst/>
-          </a:prstGeom>
-          <a:ln w="19050"/>
-        </p:spPr>
-        <p:style>
-          <a:lnRef idx="1">
-            <a:schemeClr val="accent1"/>
-          </a:lnRef>
-          <a:fillRef idx="0">
-            <a:schemeClr val="accent1"/>
-          </a:fillRef>
-          <a:effectRef idx="0">
-            <a:schemeClr val="accent1"/>
-          </a:effectRef>
-          <a:fontRef idx="minor">
-            <a:schemeClr val="tx1"/>
-          </a:fontRef>
-        </p:style>
-      </p:cxnSp>
-      <p:cxnSp>
-        <p:nvCxnSpPr>
-          <p:cNvPr id="52" name="直接连接符 51"/>
-          <p:cNvCxnSpPr/>
-          <p:nvPr/>
-        </p:nvCxnSpPr>
-        <p:spPr>
-          <a:xfrm>
-            <a:off x="6827521" y="3870433"/>
-            <a:ext cx="7890" cy="1514017"/>
-          </a:xfrm>
-          <a:prstGeom prst="line">
-            <a:avLst/>
-          </a:prstGeom>
-          <a:ln w="19050"/>
-        </p:spPr>
-        <p:style>
-          <a:lnRef idx="1">
-            <a:schemeClr val="accent1"/>
-          </a:lnRef>
-          <a:fillRef idx="0">
-            <a:schemeClr val="accent1"/>
-          </a:fillRef>
-          <a:effectRef idx="0">
-            <a:schemeClr val="accent1"/>
-          </a:effectRef>
-          <a:fontRef idx="minor">
-            <a:schemeClr val="tx1"/>
-          </a:fontRef>
-        </p:style>
-      </p:cxnSp>
-      <p:cxnSp>
-        <p:nvCxnSpPr>
-          <p:cNvPr id="56" name="直接连接符 55"/>
-          <p:cNvCxnSpPr/>
-          <p:nvPr/>
-        </p:nvCxnSpPr>
-        <p:spPr>
-          <a:xfrm>
-            <a:off x="8060745" y="3856930"/>
-            <a:ext cx="0" cy="288000"/>
-          </a:xfrm>
-          <a:prstGeom prst="line">
-            <a:avLst/>
-          </a:prstGeom>
-          <a:ln w="19050"/>
-        </p:spPr>
-        <p:style>
-          <a:lnRef idx="1">
-            <a:schemeClr val="accent1"/>
-          </a:lnRef>
-          <a:fillRef idx="0">
-            <a:schemeClr val="accent1"/>
-          </a:fillRef>
-          <a:effectRef idx="0">
-            <a:schemeClr val="accent1"/>
-          </a:effectRef>
-          <a:fontRef idx="minor">
-            <a:schemeClr val="tx1"/>
-          </a:fontRef>
-        </p:style>
-      </p:cxnSp>
-      <p:cxnSp>
-        <p:nvCxnSpPr>
-          <p:cNvPr id="57" name="直接连接符 56"/>
-          <p:cNvCxnSpPr/>
-          <p:nvPr/>
-        </p:nvCxnSpPr>
-        <p:spPr>
-          <a:xfrm>
-            <a:off x="8501748" y="3870433"/>
-            <a:ext cx="7890" cy="1514017"/>
-          </a:xfrm>
-          <a:prstGeom prst="line">
-            <a:avLst/>
-          </a:prstGeom>
-          <a:ln w="19050"/>
-        </p:spPr>
-        <p:style>
-          <a:lnRef idx="1">
-            <a:schemeClr val="accent1"/>
-          </a:lnRef>
-          <a:fillRef idx="0">
-            <a:schemeClr val="accent1"/>
-          </a:fillRef>
-          <a:effectRef idx="0">
-            <a:schemeClr val="accent1"/>
-          </a:effectRef>
-          <a:fontRef idx="minor">
-            <a:schemeClr val="tx1"/>
-          </a:fontRef>
-        </p:style>
-      </p:cxnSp>
-      <p:cxnSp>
-        <p:nvCxnSpPr>
-          <p:cNvPr id="58" name="直接连接符 57"/>
-          <p:cNvCxnSpPr/>
-          <p:nvPr/>
-        </p:nvCxnSpPr>
-        <p:spPr>
-          <a:xfrm>
-            <a:off x="9725329" y="3870433"/>
-            <a:ext cx="0" cy="288000"/>
-          </a:xfrm>
-          <a:prstGeom prst="line">
-            <a:avLst/>
-          </a:prstGeom>
-          <a:ln w="19050"/>
-        </p:spPr>
-        <p:style>
-          <a:lnRef idx="1">
-            <a:schemeClr val="accent1"/>
-          </a:lnRef>
-          <a:fillRef idx="0">
-            <a:schemeClr val="accent1"/>
-          </a:fillRef>
-          <a:effectRef idx="0">
-            <a:schemeClr val="accent1"/>
-          </a:effectRef>
-          <a:fontRef idx="minor">
-            <a:schemeClr val="tx1"/>
-          </a:fontRef>
-        </p:style>
-      </p:cxnSp>
-      <p:cxnSp>
-        <p:nvCxnSpPr>
-          <p:cNvPr id="59" name="直接连接符 58"/>
-          <p:cNvCxnSpPr/>
-          <p:nvPr/>
-        </p:nvCxnSpPr>
-        <p:spPr>
-          <a:xfrm>
-            <a:off x="10184447" y="3873139"/>
-            <a:ext cx="7890" cy="1514017"/>
-          </a:xfrm>
-          <a:prstGeom prst="line">
-            <a:avLst/>
-          </a:prstGeom>
-          <a:ln w="19050"/>
-        </p:spPr>
-        <p:style>
-          <a:lnRef idx="1">
-            <a:schemeClr val="accent1"/>
-          </a:lnRef>
-          <a:fillRef idx="0">
-            <a:schemeClr val="accent1"/>
-          </a:fillRef>
-          <a:effectRef idx="0">
-            <a:schemeClr val="accent1"/>
-          </a:effectRef>
-          <a:fontRef idx="minor">
-            <a:schemeClr val="tx1"/>
-          </a:fontRef>
-        </p:style>
-      </p:cxnSp>
-      <p:sp>
-        <p:nvSpPr>
-          <p:cNvPr id="62" name="文本框 61"/>
-          <p:cNvSpPr txBox="1"/>
-          <p:nvPr/>
-        </p:nvSpPr>
-        <p:spPr>
-          <a:xfrm>
-            <a:off x="5169674" y="1562105"/>
-            <a:ext cx="6526394" cy="1077218"/>
-          </a:xfrm>
-          <a:prstGeom prst="rect">
-            <a:avLst/>
-          </a:prstGeom>
-          <a:noFill/>
-        </p:spPr>
-        <p:txBody>
-          <a:bodyPr wrap="square" rtlCol="0">
-            <a:spAutoFit/>
-          </a:bodyPr>
-          <a:lstStyle/>
-          <a:p>
-            <a:r>
-              <a:rPr lang="en-US" altLang="zh-CN" sz="1600" smtClean="0">
-                <a:latin typeface="华文楷体" panose="02010600040101010101" pitchFamily="2" charset="-122"/>
-                <a:ea typeface="华文楷体" panose="02010600040101010101" pitchFamily="2" charset="-122"/>
-              </a:rPr>
-              <a:t>CAN Controller</a:t>
-            </a:r>
-            <a:r>
-              <a:rPr lang="zh-CN" altLang="en-US" sz="1600" smtClean="0">
-                <a:latin typeface="华文楷体" panose="02010600040101010101" pitchFamily="2" charset="-122"/>
-                <a:ea typeface="华文楷体" panose="02010600040101010101" pitchFamily="2" charset="-122"/>
-              </a:rPr>
-              <a:t>实现协议：</a:t>
-            </a:r>
-            <a:endParaRPr lang="en-US" altLang="zh-CN" sz="1600" smtClean="0">
-              <a:latin typeface="华文楷体" panose="02010600040101010101" pitchFamily="2" charset="-122"/>
-              <a:ea typeface="华文楷体" panose="02010600040101010101" pitchFamily="2" charset="-122"/>
-            </a:endParaRPr>
-          </a:p>
-          <a:p>
-            <a:r>
-              <a:rPr lang="en-US" altLang="zh-CN" sz="1600" smtClean="0">
-                <a:latin typeface="华文楷体" panose="02010600040101010101" pitchFamily="2" charset="-122"/>
-                <a:ea typeface="华文楷体" panose="02010600040101010101" pitchFamily="2" charset="-122"/>
-              </a:rPr>
-              <a:t>1</a:t>
-            </a:r>
-            <a:r>
-              <a:rPr lang="zh-CN" altLang="en-US" sz="1600" smtClean="0">
-                <a:latin typeface="华文楷体" panose="02010600040101010101" pitchFamily="2" charset="-122"/>
-                <a:ea typeface="华文楷体" panose="02010600040101010101" pitchFamily="2" charset="-122"/>
-              </a:rPr>
-              <a:t>、信息包优先级检测，伺机发送；</a:t>
-            </a:r>
-            <a:endParaRPr lang="en-US" altLang="zh-CN" sz="1600" smtClean="0">
-              <a:latin typeface="华文楷体" panose="02010600040101010101" pitchFamily="2" charset="-122"/>
-              <a:ea typeface="华文楷体" panose="02010600040101010101" pitchFamily="2" charset="-122"/>
-            </a:endParaRPr>
-          </a:p>
-          <a:p>
-            <a:r>
-              <a:rPr lang="en-US" altLang="zh-CN" sz="1600" smtClean="0">
-                <a:latin typeface="华文楷体" panose="02010600040101010101" pitchFamily="2" charset="-122"/>
-                <a:ea typeface="华文楷体" panose="02010600040101010101" pitchFamily="2" charset="-122"/>
-              </a:rPr>
-              <a:t>2</a:t>
-            </a:r>
-            <a:r>
-              <a:rPr lang="zh-CN" altLang="en-US" sz="1600" smtClean="0">
-                <a:latin typeface="华文楷体" panose="02010600040101010101" pitchFamily="2" charset="-122"/>
-                <a:ea typeface="华文楷体" panose="02010600040101010101" pitchFamily="2" charset="-122"/>
-              </a:rPr>
-              <a:t>、向消费者提供发送成功</a:t>
-            </a:r>
-            <a:r>
-              <a:rPr lang="en-US" altLang="zh-CN" sz="1600" smtClean="0">
-                <a:latin typeface="华文楷体" panose="02010600040101010101" pitchFamily="2" charset="-122"/>
-                <a:ea typeface="华文楷体" panose="02010600040101010101" pitchFamily="2" charset="-122"/>
-              </a:rPr>
-              <a:t>/</a:t>
-            </a:r>
-            <a:r>
-              <a:rPr lang="zh-CN" altLang="en-US" sz="1600" smtClean="0">
-                <a:latin typeface="华文楷体" panose="02010600040101010101" pitchFamily="2" charset="-122"/>
-                <a:ea typeface="华文楷体" panose="02010600040101010101" pitchFamily="2" charset="-122"/>
-              </a:rPr>
-              <a:t>发送失败的反馈（错误检测也是协议的内容）</a:t>
-            </a:r>
-            <a:endParaRPr lang="en-US" altLang="zh-CN" sz="1600" smtClean="0">
-              <a:latin typeface="华文楷体" panose="02010600040101010101" pitchFamily="2" charset="-122"/>
-              <a:ea typeface="华文楷体" panose="02010600040101010101" pitchFamily="2" charset="-122"/>
-            </a:endParaRPr>
-          </a:p>
-          <a:p>
-            <a:r>
-              <a:rPr lang="zh-CN" altLang="en-US" sz="1600" smtClean="0">
-                <a:latin typeface="华文楷体" panose="02010600040101010101" pitchFamily="2" charset="-122"/>
-                <a:ea typeface="华文楷体" panose="02010600040101010101" pitchFamily="2" charset="-122"/>
-              </a:rPr>
-              <a:t>应用程序负责</a:t>
-            </a:r>
-            <a:r>
-              <a:rPr lang="en-US" altLang="zh-CN" sz="1600" smtClean="0">
-                <a:latin typeface="华文楷体" panose="02010600040101010101" pitchFamily="2" charset="-122"/>
-                <a:ea typeface="华文楷体" panose="02010600040101010101" pitchFamily="2" charset="-122"/>
-              </a:rPr>
-              <a:t>can</a:t>
-            </a:r>
-            <a:r>
-              <a:rPr lang="zh-CN" altLang="en-US" sz="1600" smtClean="0">
-                <a:latin typeface="华文楷体" panose="02010600040101010101" pitchFamily="2" charset="-122"/>
-                <a:ea typeface="华文楷体" panose="02010600040101010101" pitchFamily="2" charset="-122"/>
-              </a:rPr>
-              <a:t>帧的组装</a:t>
-            </a:r>
-            <a:endParaRPr lang="zh-CN" altLang="en-US" sz="1600">
-              <a:latin typeface="华文楷体" panose="02010600040101010101" pitchFamily="2" charset="-122"/>
-              <a:ea typeface="华文楷体" panose="02010600040101010101" pitchFamily="2" charset="-122"/>
-            </a:endParaRPr>
-          </a:p>
-        </p:txBody>
-      </p:sp>
+      <p:pic>
+        <p:nvPicPr>
+          <p:cNvPr id="45" name="图片 44"/>
+          <p:cNvPicPr>
+            <a:picLocks noChangeAspect="1"/>
+          </p:cNvPicPr>
+          <p:nvPr/>
+        </p:nvPicPr>
+        <p:blipFill>
+          <a:blip r:embed="rId2"/>
+          <a:stretch>
+            <a:fillRect/>
+          </a:stretch>
+        </p:blipFill>
+        <p:spPr>
+          <a:xfrm>
+            <a:off x="2071126" y="1628523"/>
+            <a:ext cx="8049748" cy="3600953"/>
+          </a:xfrm>
+          <a:prstGeom prst="rect">
+            <a:avLst/>
+          </a:prstGeom>
+        </p:spPr>
+      </p:pic>
     </p:spTree>
     <p:extLst>
       <p:ext uri="{BB962C8B-B14F-4D97-AF65-F5344CB8AC3E}">

</xml_diff>